<commit_message>
Updated slide on math behind logistic regression
</commit_message>
<xml_diff>
--- a/5 - Logistic Regression/Introduction to Logistic Regression.pptx
+++ b/5 - Logistic Regression/Introduction to Logistic Regression.pptx
@@ -1475,7 +1475,7 @@
           <a:p>
             <a:fld id="{F666E1FD-E7A0-497B-BBC0-740BAAC97C64}" type="datetimeFigureOut">
               <a:rPr lang="en-PH" smtClean="0"/>
-              <a:t>9/23/24</a:t>
+              <a:t>9/25/24</a:t>
             </a:fld>
             <a:endParaRPr lang="en-PH"/>
           </a:p>
@@ -4076,7 +4076,7 @@
           <a:p>
             <a:fld id="{0A6B5ABE-C04B-9E45-B7F8-C552B4C8BEA7}" type="datetime1">
               <a:rPr lang="en-PH" smtClean="0"/>
-              <a:t>9/23/24</a:t>
+              <a:t>9/25/24</a:t>
             </a:fld>
             <a:endParaRPr lang="en-PH"/>
           </a:p>
@@ -4279,7 +4279,7 @@
           <a:p>
             <a:fld id="{7325A457-8FDE-EC48-8D78-6E825839CD95}" type="datetime1">
               <a:rPr lang="en-PH" smtClean="0"/>
-              <a:t>9/23/24</a:t>
+              <a:t>9/25/24</a:t>
             </a:fld>
             <a:endParaRPr lang="en-PH"/>
           </a:p>
@@ -4492,7 +4492,7 @@
           <a:p>
             <a:fld id="{7D0D2B71-89F1-1B41-8520-07265131CD6F}" type="datetime1">
               <a:rPr lang="en-PH" smtClean="0"/>
-              <a:t>9/23/24</a:t>
+              <a:t>9/25/24</a:t>
             </a:fld>
             <a:endParaRPr lang="en-PH"/>
           </a:p>
@@ -4695,7 +4695,7 @@
           <a:p>
             <a:fld id="{E37BB272-73C9-494A-AF1B-35582C7763FD}" type="datetime1">
               <a:rPr lang="en-PH" smtClean="0"/>
-              <a:t>9/23/24</a:t>
+              <a:t>9/25/24</a:t>
             </a:fld>
             <a:endParaRPr lang="en-PH"/>
           </a:p>
@@ -4974,7 +4974,7 @@
           <a:p>
             <a:fld id="{00821449-D51A-F345-BA01-D3DF4CA4D27C}" type="datetime1">
               <a:rPr lang="en-PH" smtClean="0"/>
-              <a:t>9/23/24</a:t>
+              <a:t>9/25/24</a:t>
             </a:fld>
             <a:endParaRPr lang="en-PH"/>
           </a:p>
@@ -5245,7 +5245,7 @@
           <a:p>
             <a:fld id="{AFB23440-5452-D343-8A06-08527EA413C0}" type="datetime1">
               <a:rPr lang="en-PH" smtClean="0"/>
-              <a:t>9/23/24</a:t>
+              <a:t>9/25/24</a:t>
             </a:fld>
             <a:endParaRPr lang="en-PH"/>
           </a:p>
@@ -5663,7 +5663,7 @@
           <a:p>
             <a:fld id="{5A7E670F-37FA-4A4D-9891-800FD18F253C}" type="datetime1">
               <a:rPr lang="en-PH" smtClean="0"/>
-              <a:t>9/23/24</a:t>
+              <a:t>9/25/24</a:t>
             </a:fld>
             <a:endParaRPr lang="en-PH"/>
           </a:p>
@@ -5808,7 +5808,7 @@
           <a:p>
             <a:fld id="{A86F6BAB-616B-AB47-957E-E1676E2F5090}" type="datetime1">
               <a:rPr lang="en-PH" smtClean="0"/>
-              <a:t>9/23/24</a:t>
+              <a:t>9/25/24</a:t>
             </a:fld>
             <a:endParaRPr lang="en-PH"/>
           </a:p>
@@ -5924,7 +5924,7 @@
           <a:p>
             <a:fld id="{917C2DE5-3D0B-EE43-9D27-18C511AD36EA}" type="datetime1">
               <a:rPr lang="en-PH" smtClean="0"/>
-              <a:t>9/23/24</a:t>
+              <a:t>9/25/24</a:t>
             </a:fld>
             <a:endParaRPr lang="en-PH"/>
           </a:p>
@@ -6240,7 +6240,7 @@
           <a:p>
             <a:fld id="{92C5A091-FDC0-C84E-BBD9-5D9B68627BE9}" type="datetime1">
               <a:rPr lang="en-PH" smtClean="0"/>
-              <a:t>9/23/24</a:t>
+              <a:t>9/25/24</a:t>
             </a:fld>
             <a:endParaRPr lang="en-PH"/>
           </a:p>
@@ -6532,7 +6532,7 @@
           <a:p>
             <a:fld id="{3879EA6E-C7AC-9B4C-A98F-BBAA7A99420D}" type="datetime1">
               <a:rPr lang="en-PH" smtClean="0"/>
-              <a:t>9/23/24</a:t>
+              <a:t>9/25/24</a:t>
             </a:fld>
             <a:endParaRPr lang="en-PH"/>
           </a:p>
@@ -6778,7 +6778,7 @@
           <a:p>
             <a:fld id="{73ECB854-F2BB-374D-A973-810BB65B8002}" type="datetime1">
               <a:rPr lang="en-PH" smtClean="0"/>
-              <a:t>9/23/24</a:t>
+              <a:t>9/25/24</a:t>
             </a:fld>
             <a:endParaRPr lang="en-PH"/>
           </a:p>
@@ -28937,8 +28937,8 @@
           </a:p>
         </p:txBody>
       </p:sp>
-      <mc:AlternateContent xmlns:mc="http://schemas.openxmlformats.org/markup-compatibility/2006">
-        <mc:Choice xmlns:a14="http://schemas.microsoft.com/office/drawing/2010/main" Requires="a14">
+      <mc:AlternateContent xmlns:mc="http://schemas.openxmlformats.org/markup-compatibility/2006" xmlns:a14="http://schemas.microsoft.com/office/drawing/2010/main">
+        <mc:Choice Requires="a14">
           <p:sp>
             <p:nvSpPr>
               <p:cNvPr id="5" name="TextBox 4">
@@ -29154,7 +29154,7 @@
             </p:txBody>
           </p:sp>
         </mc:Choice>
-        <mc:Fallback>
+        <mc:Fallback xmlns="">
           <p:sp>
             <p:nvSpPr>
               <p:cNvPr id="5" name="TextBox 4">
@@ -29204,8 +29204,8 @@
           </p:sp>
         </mc:Fallback>
       </mc:AlternateContent>
-      <mc:AlternateContent xmlns:mc="http://schemas.openxmlformats.org/markup-compatibility/2006">
-        <mc:Choice xmlns:a14="http://schemas.microsoft.com/office/drawing/2010/main" Requires="a14">
+      <mc:AlternateContent xmlns:mc="http://schemas.openxmlformats.org/markup-compatibility/2006" xmlns:a14="http://schemas.microsoft.com/office/drawing/2010/main">
+        <mc:Choice Requires="a14">
           <p:sp>
             <p:nvSpPr>
               <p:cNvPr id="7" name="TextBox 6">
@@ -29340,7 +29340,7 @@
             </p:txBody>
           </p:sp>
         </mc:Choice>
-        <mc:Fallback>
+        <mc:Fallback xmlns="">
           <p:sp>
             <p:nvSpPr>
               <p:cNvPr id="7" name="TextBox 6">
@@ -39744,21 +39744,6 @@
 </file>
 
 <file path=customXml/item1.xml><?xml version="1.0" encoding="utf-8"?>
-<p:properties xmlns:p="http://schemas.microsoft.com/office/2006/metadata/properties" xmlns:xsi="http://www.w3.org/2001/XMLSchema-instance" xmlns:pc="http://schemas.microsoft.com/office/infopath/2007/PartnerControls">
-  <documentManagement/>
-</p:properties>
-</file>
-
-<file path=customXml/item2.xml><?xml version="1.0" encoding="utf-8"?>
-<?mso-contentType ?>
-<FormTemplates xmlns="http://schemas.microsoft.com/sharepoint/v3/contenttype/forms">
-  <Display>DocumentLibraryForm</Display>
-  <Edit>DocumentLibraryForm</Edit>
-  <New>DocumentLibraryForm</New>
-</FormTemplates>
-</file>
-
-<file path=customXml/item3.xml><?xml version="1.0" encoding="utf-8"?>
 <ct:contentTypeSchema xmlns:ct="http://schemas.microsoft.com/office/2006/metadata/contentType" xmlns:ma="http://schemas.microsoft.com/office/2006/metadata/properties/metaAttributes" ct:_="" ma:_="" ma:contentTypeName="Document" ma:contentTypeID="0x0101007188BDCA587B344BBA6CB1A93FAE6998" ma:contentTypeVersion="2" ma:contentTypeDescription="Create a new document." ma:contentTypeScope="" ma:versionID="7a8e4b6720badb2566a0cfeddfaf2856">
   <xsd:schema xmlns:xsd="http://www.w3.org/2001/XMLSchema" xmlns:xs="http://www.w3.org/2001/XMLSchema" xmlns:p="http://schemas.microsoft.com/office/2006/metadata/properties" xmlns:ns2="ba111d12-426d-4af0-bcb6-460e36974645" targetNamespace="http://schemas.microsoft.com/office/2006/metadata/properties" ma:root="true" ma:fieldsID="989b05398519136c88ba0a8d54e3c3da" ns2:_="">
     <xsd:import namespace="ba111d12-426d-4af0-bcb6-460e36974645"/>
@@ -39890,24 +39875,22 @@
 </ct:contentTypeSchema>
 </file>
 
-<file path=customXml/itemProps1.xml><?xml version="1.0" encoding="utf-8"?>
-<ds:datastoreItem xmlns:ds="http://schemas.openxmlformats.org/officeDocument/2006/customXml" ds:itemID="{7ACF14CA-9E7F-410C-99DF-E0FAFDE78C11}">
-  <ds:schemaRefs>
-    <ds:schemaRef ds:uri="http://schemas.microsoft.com/office/2006/metadata/properties"/>
-    <ds:schemaRef ds:uri="http://schemas.microsoft.com/office/infopath/2007/PartnerControls"/>
-  </ds:schemaRefs>
-</ds:datastoreItem>
+<file path=customXml/item2.xml><?xml version="1.0" encoding="utf-8"?>
+<p:properties xmlns:p="http://schemas.microsoft.com/office/2006/metadata/properties" xmlns:xsi="http://www.w3.org/2001/XMLSchema-instance" xmlns:pc="http://schemas.microsoft.com/office/infopath/2007/PartnerControls">
+  <documentManagement/>
+</p:properties>
 </file>
 
-<file path=customXml/itemProps2.xml><?xml version="1.0" encoding="utf-8"?>
-<ds:datastoreItem xmlns:ds="http://schemas.openxmlformats.org/officeDocument/2006/customXml" ds:itemID="{6C1A3F1B-CE3A-47AB-9F84-47E786467973}">
-  <ds:schemaRefs>
-    <ds:schemaRef ds:uri="http://schemas.microsoft.com/sharepoint/v3/contenttype/forms"/>
-  </ds:schemaRefs>
-</ds:datastoreItem>
+<file path=customXml/item3.xml><?xml version="1.0" encoding="utf-8"?>
+<?mso-contentType ?>
+<FormTemplates xmlns="http://schemas.microsoft.com/sharepoint/v3/contenttype/forms">
+  <Display>DocumentLibraryForm</Display>
+  <Edit>DocumentLibraryForm</Edit>
+  <New>DocumentLibraryForm</New>
+</FormTemplates>
 </file>
 
-<file path=customXml/itemProps3.xml><?xml version="1.0" encoding="utf-8"?>
+<file path=customXml/itemProps1.xml><?xml version="1.0" encoding="utf-8"?>
 <ds:datastoreItem xmlns:ds="http://schemas.openxmlformats.org/officeDocument/2006/customXml" ds:itemID="{D622FF19-6ECD-4B79-A412-9430824D2BB6}">
   <ds:schemaRefs>
     <ds:schemaRef ds:uri="http://schemas.microsoft.com/office/2006/metadata/contentType"/>
@@ -39923,4 +39906,21 @@
     <ds:schemaRef ds:uri="http://schemas.microsoft.com/internal/obd"/>
   </ds:schemaRefs>
 </ds:datastoreItem>
+</file>
+
+<file path=customXml/itemProps2.xml><?xml version="1.0" encoding="utf-8"?>
+<ds:datastoreItem xmlns:ds="http://schemas.openxmlformats.org/officeDocument/2006/customXml" ds:itemID="{7ACF14CA-9E7F-410C-99DF-E0FAFDE78C11}">
+  <ds:schemaRefs>
+    <ds:schemaRef ds:uri="http://schemas.microsoft.com/office/2006/metadata/properties"/>
+    <ds:schemaRef ds:uri="http://schemas.microsoft.com/office/infopath/2007/PartnerControls"/>
+  </ds:schemaRefs>
+</ds:datastoreItem>
+</file>
+
+<file path=customXml/itemProps3.xml><?xml version="1.0" encoding="utf-8"?>
+<ds:datastoreItem xmlns:ds="http://schemas.openxmlformats.org/officeDocument/2006/customXml" ds:itemID="{6C1A3F1B-CE3A-47AB-9F84-47E786467973}">
+  <ds:schemaRefs>
+    <ds:schemaRef ds:uri="http://schemas.microsoft.com/sharepoint/v3/contenttype/forms"/>
+  </ds:schemaRefs>
+</ds:datastoreItem>
 </file>
</xml_diff>